<commit_message>
Change UI class diagram
</commit_message>
<xml_diff>
--- a/docs/diagrams/UiComponentClassDiagram.pptx
+++ b/docs/diagrams/UiComponentClassDiagram.pptx
@@ -208,7 +208,7 @@
           <a:p>
             <a:fld id="{F5CC4B3F-88C1-4FFA-B1B6-F41C21DC6924}" type="datetimeFigureOut">
               <a:rPr lang="en-US" smtClean="0"/>
-              <a:t>12/15/2018</a:t>
+              <a:t>4/14/2019</a:t>
             </a:fld>
             <a:endParaRPr lang="en-US"/>
           </a:p>
@@ -654,7 +654,7 @@
           <a:p>
             <a:fld id="{78C97017-6FC3-485B-9764-EAC9E56C1D49}" type="datetimeFigureOut">
               <a:rPr lang="en-US" smtClean="0"/>
-              <a:t>12/15/2018</a:t>
+              <a:t>4/14/2019</a:t>
             </a:fld>
             <a:endParaRPr lang="en-US"/>
           </a:p>
@@ -822,7 +822,7 @@
           <a:p>
             <a:fld id="{78C97017-6FC3-485B-9764-EAC9E56C1D49}" type="datetimeFigureOut">
               <a:rPr lang="en-US" smtClean="0"/>
-              <a:t>12/15/2018</a:t>
+              <a:t>4/14/2019</a:t>
             </a:fld>
             <a:endParaRPr lang="en-US"/>
           </a:p>
@@ -1000,7 +1000,7 @@
           <a:p>
             <a:fld id="{78C97017-6FC3-485B-9764-EAC9E56C1D49}" type="datetimeFigureOut">
               <a:rPr lang="en-US" smtClean="0"/>
-              <a:t>12/15/2018</a:t>
+              <a:t>4/14/2019</a:t>
             </a:fld>
             <a:endParaRPr lang="en-US"/>
           </a:p>
@@ -1168,7 +1168,7 @@
           <a:p>
             <a:fld id="{78C97017-6FC3-485B-9764-EAC9E56C1D49}" type="datetimeFigureOut">
               <a:rPr lang="en-US" smtClean="0"/>
-              <a:t>12/15/2018</a:t>
+              <a:t>4/14/2019</a:t>
             </a:fld>
             <a:endParaRPr lang="en-US"/>
           </a:p>
@@ -1413,7 +1413,7 @@
           <a:p>
             <a:fld id="{78C97017-6FC3-485B-9764-EAC9E56C1D49}" type="datetimeFigureOut">
               <a:rPr lang="en-US" smtClean="0"/>
-              <a:t>12/15/2018</a:t>
+              <a:t>4/14/2019</a:t>
             </a:fld>
             <a:endParaRPr lang="en-US"/>
           </a:p>
@@ -1698,7 +1698,7 @@
           <a:p>
             <a:fld id="{78C97017-6FC3-485B-9764-EAC9E56C1D49}" type="datetimeFigureOut">
               <a:rPr lang="en-US" smtClean="0"/>
-              <a:t>12/15/2018</a:t>
+              <a:t>4/14/2019</a:t>
             </a:fld>
             <a:endParaRPr lang="en-US"/>
           </a:p>
@@ -2117,7 +2117,7 @@
           <a:p>
             <a:fld id="{78C97017-6FC3-485B-9764-EAC9E56C1D49}" type="datetimeFigureOut">
               <a:rPr lang="en-US" smtClean="0"/>
-              <a:t>12/15/2018</a:t>
+              <a:t>4/14/2019</a:t>
             </a:fld>
             <a:endParaRPr lang="en-US"/>
           </a:p>
@@ -2234,7 +2234,7 @@
           <a:p>
             <a:fld id="{78C97017-6FC3-485B-9764-EAC9E56C1D49}" type="datetimeFigureOut">
               <a:rPr lang="en-US" smtClean="0"/>
-              <a:t>12/15/2018</a:t>
+              <a:t>4/14/2019</a:t>
             </a:fld>
             <a:endParaRPr lang="en-US"/>
           </a:p>
@@ -2329,7 +2329,7 @@
           <a:p>
             <a:fld id="{78C97017-6FC3-485B-9764-EAC9E56C1D49}" type="datetimeFigureOut">
               <a:rPr lang="en-US" smtClean="0"/>
-              <a:t>12/15/2018</a:t>
+              <a:t>4/14/2019</a:t>
             </a:fld>
             <a:endParaRPr lang="en-US"/>
           </a:p>
@@ -2604,7 +2604,7 @@
           <a:p>
             <a:fld id="{78C97017-6FC3-485B-9764-EAC9E56C1D49}" type="datetimeFigureOut">
               <a:rPr lang="en-US" smtClean="0"/>
-              <a:t>12/15/2018</a:t>
+              <a:t>4/14/2019</a:t>
             </a:fld>
             <a:endParaRPr lang="en-US"/>
           </a:p>
@@ -2856,7 +2856,7 @@
           <a:p>
             <a:fld id="{78C97017-6FC3-485B-9764-EAC9E56C1D49}" type="datetimeFigureOut">
               <a:rPr lang="en-US" smtClean="0"/>
-              <a:t>12/15/2018</a:t>
+              <a:t>4/14/2019</a:t>
             </a:fld>
             <a:endParaRPr lang="en-US"/>
           </a:p>
@@ -3067,7 +3067,7 @@
           <a:p>
             <a:fld id="{78C97017-6FC3-485B-9764-EAC9E56C1D49}" type="datetimeFigureOut">
               <a:rPr lang="en-US" smtClean="0"/>
-              <a:t>12/15/2018</a:t>
+              <a:t>4/14/2019</a:t>
             </a:fld>
             <a:endParaRPr lang="en-US"/>
           </a:p>
@@ -3450,8 +3450,8 @@
         </p:nvSpPr>
         <p:spPr>
           <a:xfrm>
-            <a:off x="1217465" y="1447800"/>
-            <a:ext cx="4917083" cy="3962400"/>
+            <a:off x="1329640" y="1447798"/>
+            <a:ext cx="4944506" cy="4074551"/>
           </a:xfrm>
           <a:prstGeom prst="roundRect">
             <a:avLst>
@@ -3782,7 +3782,7 @@
         </p:nvCxnSpPr>
         <p:spPr>
           <a:xfrm flipV="1">
-            <a:off x="644735" y="2991937"/>
+            <a:off x="732634" y="3000987"/>
             <a:ext cx="684904" cy="1"/>
           </a:xfrm>
           <a:prstGeom prst="bentConnector3">
@@ -3945,7 +3945,7 @@
         </p:nvSpPr>
         <p:spPr>
           <a:xfrm>
-            <a:off x="2592527" y="4563759"/>
+            <a:off x="2601088" y="4532462"/>
             <a:ext cx="1093635" cy="236841"/>
           </a:xfrm>
           <a:prstGeom prst="rect">
@@ -4065,7 +4065,7 @@
         </p:nvSpPr>
         <p:spPr>
           <a:xfrm>
-            <a:off x="3839323" y="4228801"/>
+            <a:off x="3794210" y="4211486"/>
             <a:ext cx="1040906" cy="236841"/>
           </a:xfrm>
           <a:prstGeom prst="rect">
@@ -4125,7 +4125,7 @@
         </p:nvSpPr>
         <p:spPr>
           <a:xfrm>
-            <a:off x="2592528" y="4966000"/>
+            <a:off x="2596807" y="5157424"/>
             <a:ext cx="1093635" cy="236841"/>
           </a:xfrm>
           <a:prstGeom prst="rect">
@@ -4412,55 +4412,14 @@
         <p:nvCxnSpPr>
           <p:cNvPr id="50" name="Elbow Connector 63"/>
           <p:cNvCxnSpPr>
-            <a:stCxn id="39" idx="2"/>
-            <a:endCxn id="35" idx="1"/>
+            <a:cxnSpLocks/>
           </p:cNvCxnSpPr>
           <p:nvPr/>
         </p:nvCxnSpPr>
         <p:spPr>
           <a:xfrm rot="16200000" flipH="1">
-            <a:off x="1597249" y="3686901"/>
-            <a:ext cx="1814155" cy="176401"/>
-          </a:xfrm>
-          <a:prstGeom prst="bentConnector2">
-            <a:avLst/>
-          </a:prstGeom>
-          <a:ln w="19050">
-            <a:solidFill>
-              <a:schemeClr val="accent3"/>
-            </a:solidFill>
-            <a:headEnd type="none" w="med" len="med"/>
-            <a:tailEnd type="arrow" w="med" len="med"/>
-          </a:ln>
-          <a:effectLst/>
-        </p:spPr>
-        <p:style>
-          <a:lnRef idx="1">
-            <a:schemeClr val="accent2"/>
-          </a:lnRef>
-          <a:fillRef idx="2">
-            <a:schemeClr val="accent2"/>
-          </a:fillRef>
-          <a:effectRef idx="1">
-            <a:schemeClr val="accent2"/>
-          </a:effectRef>
-          <a:fontRef idx="minor">
-            <a:schemeClr val="dk1"/>
-          </a:fontRef>
-        </p:style>
-      </p:cxnSp>
-      <p:cxnSp>
-        <p:nvCxnSpPr>
-          <p:cNvPr id="53" name="Elbow Connector 63"/>
-          <p:cNvCxnSpPr>
-            <a:endCxn id="38" idx="1"/>
-          </p:cNvCxnSpPr>
-          <p:nvPr/>
-        </p:nvCxnSpPr>
-        <p:spPr>
-          <a:xfrm rot="16200000" flipH="1">
-            <a:off x="1184119" y="3676012"/>
-            <a:ext cx="2396440" cy="420377"/>
+            <a:off x="1615037" y="3684830"/>
+            <a:ext cx="1782858" cy="184962"/>
           </a:xfrm>
           <a:prstGeom prst="bentConnector2">
             <a:avLst/>
@@ -4620,8 +4579,8 @@
         </p:nvCxnSpPr>
         <p:spPr>
           <a:xfrm rot="5400000">
-            <a:off x="4174488" y="2991741"/>
-            <a:ext cx="2061222" cy="649740"/>
+            <a:off x="4160590" y="2960527"/>
+            <a:ext cx="2043907" cy="694853"/>
           </a:xfrm>
           <a:prstGeom prst="bentConnector2">
             <a:avLst/>
@@ -4743,8 +4702,8 @@
         </p:nvCxnSpPr>
         <p:spPr>
           <a:xfrm rot="5400000">
-            <a:off x="3409976" y="2562187"/>
-            <a:ext cx="2396180" cy="1843807"/>
+            <a:off x="3429905" y="2550818"/>
+            <a:ext cx="2364883" cy="1835246"/>
           </a:xfrm>
           <a:prstGeom prst="bentConnector2">
             <a:avLst/>
@@ -4784,8 +4743,8 @@
         </p:nvCxnSpPr>
         <p:spPr>
           <a:xfrm rot="5400000">
-            <a:off x="3208856" y="2763307"/>
-            <a:ext cx="2798421" cy="1843806"/>
+            <a:off x="3115284" y="2861159"/>
+            <a:ext cx="2989845" cy="1839527"/>
           </a:xfrm>
           <a:prstGeom prst="bentConnector2">
             <a:avLst/>
@@ -4923,7 +4882,7 @@
         </p:nvSpPr>
         <p:spPr>
           <a:xfrm rot="16200000">
-            <a:off x="956202" y="2861202"/>
+            <a:off x="1052554" y="2871102"/>
             <a:ext cx="1093635" cy="346760"/>
           </a:xfrm>
           <a:prstGeom prst="rect">
@@ -5168,8 +5127,8 @@
         </p:nvCxnSpPr>
         <p:spPr>
           <a:xfrm rot="16200000" flipH="1">
-            <a:off x="3430123" y="3938021"/>
-            <a:ext cx="118421" cy="699979"/>
+            <a:off x="3416224" y="3951921"/>
+            <a:ext cx="101106" cy="654866"/>
           </a:xfrm>
           <a:prstGeom prst="bentConnector2">
             <a:avLst/>
@@ -5435,7 +5394,7 @@
         </p:nvSpPr>
         <p:spPr>
           <a:xfrm flipV="1">
-            <a:off x="4114799" y="4472708"/>
+            <a:off x="4073619" y="4463963"/>
             <a:ext cx="2642195" cy="101600"/>
           </a:xfrm>
           <a:custGeom>
@@ -5509,6 +5468,404 @@
           </a:p>
         </p:txBody>
       </p:sp>
+      <p:cxnSp>
+        <p:nvCxnSpPr>
+          <p:cNvPr id="20" name="Connector: Elbow 19">
+            <a:extLst>
+              <a:ext uri="{FF2B5EF4-FFF2-40B4-BE49-F238E27FC236}">
+                <a16:creationId xmlns:a16="http://schemas.microsoft.com/office/drawing/2014/main" id="{FF7B5105-F40A-48F8-9CC8-516BFBCD8107}"/>
+              </a:ext>
+            </a:extLst>
+          </p:cNvPr>
+          <p:cNvCxnSpPr>
+            <a:cxnSpLocks/>
+            <a:endCxn id="38" idx="1"/>
+          </p:cNvCxnSpPr>
+          <p:nvPr/>
+        </p:nvCxnSpPr>
+        <p:spPr>
+          <a:xfrm rot="16200000" flipH="1">
+            <a:off x="1090960" y="3769997"/>
+            <a:ext cx="2587865" cy="423829"/>
+          </a:xfrm>
+          <a:prstGeom prst="bentConnector2">
+            <a:avLst/>
+          </a:prstGeom>
+          <a:ln w="19050"/>
+        </p:spPr>
+        <p:style>
+          <a:lnRef idx="1">
+            <a:schemeClr val="accent3"/>
+          </a:lnRef>
+          <a:fillRef idx="0">
+            <a:schemeClr val="accent3"/>
+          </a:fillRef>
+          <a:effectRef idx="0">
+            <a:schemeClr val="accent3"/>
+          </a:effectRef>
+          <a:fontRef idx="minor">
+            <a:schemeClr val="tx1"/>
+          </a:fontRef>
+        </p:style>
+      </p:cxnSp>
+      <p:sp>
+        <p:nvSpPr>
+          <p:cNvPr id="61" name="Rectangle 11">
+            <a:extLst>
+              <a:ext uri="{FF2B5EF4-FFF2-40B4-BE49-F238E27FC236}">
+                <a16:creationId xmlns:a16="http://schemas.microsoft.com/office/drawing/2014/main" id="{E5477980-9C3D-4D99-A1BB-B6A8D66B43B8}"/>
+              </a:ext>
+            </a:extLst>
+          </p:cNvPr>
+          <p:cNvSpPr/>
+          <p:nvPr/>
+        </p:nvSpPr>
+        <p:spPr>
+          <a:xfrm>
+            <a:off x="2592525" y="4844943"/>
+            <a:ext cx="1093635" cy="236841"/>
+          </a:xfrm>
+          <a:prstGeom prst="rect">
+            <a:avLst/>
+          </a:prstGeom>
+          <a:ln w="19050">
+            <a:solidFill>
+              <a:schemeClr val="accent3"/>
+            </a:solidFill>
+          </a:ln>
+          <a:effectLst/>
+        </p:spPr>
+        <p:style>
+          <a:lnRef idx="1">
+            <a:schemeClr val="accent3"/>
+          </a:lnRef>
+          <a:fillRef idx="2">
+            <a:schemeClr val="accent3"/>
+          </a:fillRef>
+          <a:effectRef idx="1">
+            <a:schemeClr val="accent3"/>
+          </a:effectRef>
+          <a:fontRef idx="minor">
+            <a:schemeClr val="dk1"/>
+          </a:fontRef>
+        </p:style>
+        <p:txBody>
+          <a:bodyPr rtlCol="0" anchor="ctr"/>
+          <a:lstStyle/>
+          <a:p>
+            <a:pPr algn="ctr"/>
+            <a:r>
+              <a:rPr lang="en-US" sz="1050" b="1" dirty="0" err="1">
+                <a:solidFill>
+                  <a:schemeClr val="accent3">
+                    <a:lumMod val="75000"/>
+                  </a:schemeClr>
+                </a:solidFill>
+              </a:rPr>
+              <a:t>CalendarView</a:t>
+            </a:r>
+            <a:endParaRPr lang="en-SG" sz="1050" b="1" dirty="0">
+              <a:solidFill>
+                <a:schemeClr val="accent3">
+                  <a:lumMod val="75000"/>
+                </a:schemeClr>
+              </a:solidFill>
+            </a:endParaRPr>
+          </a:p>
+        </p:txBody>
+      </p:sp>
+      <p:cxnSp>
+        <p:nvCxnSpPr>
+          <p:cNvPr id="75" name="Elbow Connector 63">
+            <a:extLst>
+              <a:ext uri="{FF2B5EF4-FFF2-40B4-BE49-F238E27FC236}">
+                <a16:creationId xmlns:a16="http://schemas.microsoft.com/office/drawing/2014/main" id="{97DC381E-ECE0-4EE9-AFDC-2241595FD39C}"/>
+              </a:ext>
+            </a:extLst>
+          </p:cNvPr>
+          <p:cNvCxnSpPr>
+            <a:cxnSpLocks/>
+            <a:stCxn id="39" idx="2"/>
+            <a:endCxn id="61" idx="1"/>
+          </p:cNvCxnSpPr>
+          <p:nvPr/>
+        </p:nvCxnSpPr>
+        <p:spPr>
+          <a:xfrm rot="16200000" flipH="1">
+            <a:off x="1456656" y="3827494"/>
+            <a:ext cx="2095339" cy="176399"/>
+          </a:xfrm>
+          <a:prstGeom prst="bentConnector2">
+            <a:avLst/>
+          </a:prstGeom>
+          <a:ln w="19050">
+            <a:solidFill>
+              <a:schemeClr val="accent3"/>
+            </a:solidFill>
+            <a:headEnd type="none" w="med" len="med"/>
+            <a:tailEnd type="arrow" w="med" len="med"/>
+          </a:ln>
+          <a:effectLst/>
+        </p:spPr>
+        <p:style>
+          <a:lnRef idx="1">
+            <a:schemeClr val="accent2"/>
+          </a:lnRef>
+          <a:fillRef idx="2">
+            <a:schemeClr val="accent2"/>
+          </a:fillRef>
+          <a:effectRef idx="1">
+            <a:schemeClr val="accent2"/>
+          </a:effectRef>
+          <a:fontRef idx="minor">
+            <a:schemeClr val="dk1"/>
+          </a:fontRef>
+        </p:style>
+      </p:cxnSp>
+      <p:cxnSp>
+        <p:nvCxnSpPr>
+          <p:cNvPr id="79" name="Elbow Connector 63">
+            <a:extLst>
+              <a:ext uri="{FF2B5EF4-FFF2-40B4-BE49-F238E27FC236}">
+                <a16:creationId xmlns:a16="http://schemas.microsoft.com/office/drawing/2014/main" id="{6C834A78-EDB5-49F4-8586-97BF2EAAD019}"/>
+              </a:ext>
+            </a:extLst>
+          </p:cNvPr>
+          <p:cNvCxnSpPr>
+            <a:cxnSpLocks/>
+            <a:endCxn id="61" idx="3"/>
+          </p:cNvCxnSpPr>
+          <p:nvPr/>
+        </p:nvCxnSpPr>
+        <p:spPr>
+          <a:xfrm rot="5400000">
+            <a:off x="3280044" y="2713434"/>
+            <a:ext cx="2656047" cy="1843813"/>
+          </a:xfrm>
+          <a:prstGeom prst="bentConnector2">
+            <a:avLst/>
+          </a:prstGeom>
+          <a:ln w="6350">
+            <a:solidFill>
+              <a:schemeClr val="accent3"/>
+            </a:solidFill>
+            <a:headEnd type="none" w="med" len="med"/>
+            <a:tailEnd type="none" w="med" len="med"/>
+          </a:ln>
+          <a:effectLst/>
+        </p:spPr>
+        <p:style>
+          <a:lnRef idx="1">
+            <a:schemeClr val="accent2"/>
+          </a:lnRef>
+          <a:fillRef idx="2">
+            <a:schemeClr val="accent2"/>
+          </a:fillRef>
+          <a:effectRef idx="1">
+            <a:schemeClr val="accent2"/>
+          </a:effectRef>
+          <a:fontRef idx="minor">
+            <a:schemeClr val="dk1"/>
+          </a:fontRef>
+        </p:style>
+      </p:cxnSp>
+      <p:sp>
+        <p:nvSpPr>
+          <p:cNvPr id="83" name="Freeform 117">
+            <a:extLst>
+              <a:ext uri="{FF2B5EF4-FFF2-40B4-BE49-F238E27FC236}">
+                <a16:creationId xmlns:a16="http://schemas.microsoft.com/office/drawing/2014/main" id="{C3F56565-90DF-4539-9006-29A5DE8F362A}"/>
+              </a:ext>
+            </a:extLst>
+          </p:cNvPr>
+          <p:cNvSpPr/>
+          <p:nvPr/>
+        </p:nvSpPr>
+        <p:spPr>
+          <a:xfrm flipV="1">
+            <a:off x="3685221" y="5053136"/>
+            <a:ext cx="3050295" cy="134407"/>
+          </a:xfrm>
+          <a:custGeom>
+            <a:avLst/>
+            <a:gdLst>
+              <a:gd name="connsiteX0" fmla="*/ 0 w 3048000"/>
+              <a:gd name="connsiteY0" fmla="*/ 203200 h 203200"/>
+              <a:gd name="connsiteX1" fmla="*/ 221673 w 3048000"/>
+              <a:gd name="connsiteY1" fmla="*/ 0 h 203200"/>
+              <a:gd name="connsiteX2" fmla="*/ 3048000 w 3048000"/>
+              <a:gd name="connsiteY2" fmla="*/ 0 h 203200"/>
+            </a:gdLst>
+            <a:ahLst/>
+            <a:cxnLst>
+              <a:cxn ang="0">
+                <a:pos x="connsiteX0" y="connsiteY0"/>
+              </a:cxn>
+              <a:cxn ang="0">
+                <a:pos x="connsiteX1" y="connsiteY1"/>
+              </a:cxn>
+              <a:cxn ang="0">
+                <a:pos x="connsiteX2" y="connsiteY2"/>
+              </a:cxn>
+            </a:cxnLst>
+            <a:rect l="l" t="t" r="r" b="b"/>
+            <a:pathLst>
+              <a:path w="3048000" h="203200">
+                <a:moveTo>
+                  <a:pt x="0" y="203200"/>
+                </a:moveTo>
+                <a:lnTo>
+                  <a:pt x="221673" y="0"/>
+                </a:lnTo>
+                <a:lnTo>
+                  <a:pt x="3048000" y="0"/>
+                </a:lnTo>
+              </a:path>
+            </a:pathLst>
+          </a:custGeom>
+          <a:noFill/>
+          <a:ln w="19050">
+            <a:solidFill>
+              <a:schemeClr val="accent3"/>
+            </a:solidFill>
+            <a:prstDash val="sysDot"/>
+            <a:headEnd type="none" w="med" len="med"/>
+            <a:tailEnd type="arrow" w="med" len="med"/>
+          </a:ln>
+          <a:effectLst/>
+        </p:spPr>
+        <p:style>
+          <a:lnRef idx="1">
+            <a:schemeClr val="accent2"/>
+          </a:lnRef>
+          <a:fillRef idx="2">
+            <a:schemeClr val="accent2"/>
+          </a:fillRef>
+          <a:effectRef idx="1">
+            <a:schemeClr val="accent2"/>
+          </a:effectRef>
+          <a:fontRef idx="minor">
+            <a:schemeClr val="dk1"/>
+          </a:fontRef>
+        </p:style>
+        <p:txBody>
+          <a:bodyPr rtlCol="0" anchor="ctr"/>
+          <a:lstStyle/>
+          <a:p>
+            <a:pPr algn="ctr"/>
+            <a:endParaRPr lang="en-SG"/>
+          </a:p>
+        </p:txBody>
+      </p:sp>
+      <p:sp>
+        <p:nvSpPr>
+          <p:cNvPr id="84" name="Rectangle 11">
+            <a:extLst>
+              <a:ext uri="{FF2B5EF4-FFF2-40B4-BE49-F238E27FC236}">
+                <a16:creationId xmlns:a16="http://schemas.microsoft.com/office/drawing/2014/main" id="{57BCC885-0908-42BD-B742-B09DC12DF6A6}"/>
+              </a:ext>
+            </a:extLst>
+          </p:cNvPr>
+          <p:cNvSpPr/>
+          <p:nvPr/>
+        </p:nvSpPr>
+        <p:spPr>
+          <a:xfrm>
+            <a:off x="3873041" y="1817916"/>
+            <a:ext cx="1093635" cy="236841"/>
+          </a:xfrm>
+          <a:prstGeom prst="rect">
+            <a:avLst/>
+          </a:prstGeom>
+          <a:ln w="19050">
+            <a:solidFill>
+              <a:schemeClr val="accent3"/>
+            </a:solidFill>
+          </a:ln>
+          <a:effectLst/>
+        </p:spPr>
+        <p:style>
+          <a:lnRef idx="1">
+            <a:schemeClr val="accent3"/>
+          </a:lnRef>
+          <a:fillRef idx="2">
+            <a:schemeClr val="accent3"/>
+          </a:fillRef>
+          <a:effectRef idx="1">
+            <a:schemeClr val="accent3"/>
+          </a:effectRef>
+          <a:fontRef idx="minor">
+            <a:schemeClr val="dk1"/>
+          </a:fontRef>
+        </p:style>
+        <p:txBody>
+          <a:bodyPr rtlCol="0" anchor="ctr"/>
+          <a:lstStyle/>
+          <a:p>
+            <a:pPr algn="ctr"/>
+            <a:r>
+              <a:rPr lang="en-US" sz="1050" b="1" dirty="0" err="1">
+                <a:solidFill>
+                  <a:schemeClr val="accent3">
+                    <a:lumMod val="75000"/>
+                  </a:schemeClr>
+                </a:solidFill>
+              </a:rPr>
+              <a:t>LoginBox</a:t>
+            </a:r>
+            <a:endParaRPr lang="en-SG" sz="1050" b="1" dirty="0">
+              <a:solidFill>
+                <a:schemeClr val="accent3">
+                  <a:lumMod val="75000"/>
+                </a:schemeClr>
+              </a:solidFill>
+            </a:endParaRPr>
+          </a:p>
+        </p:txBody>
+      </p:sp>
+      <p:cxnSp>
+        <p:nvCxnSpPr>
+          <p:cNvPr id="89" name="Elbow Connector 122">
+            <a:extLst>
+              <a:ext uri="{FF2B5EF4-FFF2-40B4-BE49-F238E27FC236}">
+                <a16:creationId xmlns:a16="http://schemas.microsoft.com/office/drawing/2014/main" id="{EF2C4D0B-DF4E-4C70-9800-2127A5A1D2E7}"/>
+              </a:ext>
+            </a:extLst>
+          </p:cNvPr>
+          <p:cNvCxnSpPr/>
+          <p:nvPr/>
+        </p:nvCxnSpPr>
+        <p:spPr>
+          <a:xfrm flipV="1">
+            <a:off x="3188137" y="1947126"/>
+            <a:ext cx="684904" cy="1"/>
+          </a:xfrm>
+          <a:prstGeom prst="bentConnector3">
+            <a:avLst>
+              <a:gd name="adj1" fmla="val 50000"/>
+            </a:avLst>
+          </a:prstGeom>
+          <a:ln w="19050">
+            <a:prstDash val="sysDot"/>
+            <a:headEnd type="none" w="med" len="med"/>
+            <a:tailEnd type="arrow" w="med" len="med"/>
+          </a:ln>
+        </p:spPr>
+        <p:style>
+          <a:lnRef idx="1">
+            <a:schemeClr val="accent3"/>
+          </a:lnRef>
+          <a:fillRef idx="0">
+            <a:schemeClr val="accent3"/>
+          </a:fillRef>
+          <a:effectRef idx="0">
+            <a:schemeClr val="accent3"/>
+          </a:effectRef>
+          <a:fontRef idx="minor">
+            <a:schemeClr val="tx1"/>
+          </a:fontRef>
+        </p:style>
+      </p:cxnSp>
     </p:spTree>
     <p:extLst>
       <p:ext uri="{BB962C8B-B14F-4D97-AF65-F5344CB8AC3E}">

</xml_diff>